<commit_message>
Added slide on Multi Threaded servers
</commit_message>
<xml_diff>
--- a/threading.pptx
+++ b/threading.pptx
@@ -5,7 +5,7 @@
     <p:sldMasterId id="2147483660" r:id="rId1"/>
   </p:sldMasterIdLst>
   <p:notesMasterIdLst>
-    <p:notesMasterId r:id="rId13"/>
+    <p:notesMasterId r:id="rId14"/>
   </p:notesMasterIdLst>
   <p:sldIdLst>
     <p:sldId id="256" r:id="rId2"/>
@@ -18,7 +18,8 @@
     <p:sldId id="263" r:id="rId9"/>
     <p:sldId id="264" r:id="rId10"/>
     <p:sldId id="265" r:id="rId11"/>
-    <p:sldId id="266" r:id="rId12"/>
+    <p:sldId id="267" r:id="rId12"/>
+    <p:sldId id="266" r:id="rId13"/>
   </p:sldIdLst>
   <p:sldSz cx="12192000" cy="6858000"/>
   <p:notesSz cx="6858000" cy="9144000"/>
@@ -207,7 +208,7 @@
           <a:p>
             <a:fld id="{C9910A54-8558-4BC2-AC3B-D7C0445DE810}" type="datetimeFigureOut">
               <a:rPr lang="en-US" smtClean="0"/>
-              <a:t>9/27/2021</a:t>
+              <a:t>9/29/2021</a:t>
             </a:fld>
             <a:endParaRPr lang="en-US"/>
           </a:p>
@@ -689,7 +690,7 @@
           <a:p>
             <a:fld id="{FC8B51DD-4D59-4D3C-ADD1-B451BDC2F957}" type="datetimeFigureOut">
               <a:rPr lang="en-US" smtClean="0"/>
-              <a:t>9/27/2021</a:t>
+              <a:t>9/29/2021</a:t>
             </a:fld>
             <a:endParaRPr lang="en-US"/>
           </a:p>
@@ -859,7 +860,7 @@
           <a:p>
             <a:fld id="{FC8B51DD-4D59-4D3C-ADD1-B451BDC2F957}" type="datetimeFigureOut">
               <a:rPr lang="en-US" smtClean="0"/>
-              <a:t>9/27/2021</a:t>
+              <a:t>9/29/2021</a:t>
             </a:fld>
             <a:endParaRPr lang="en-US"/>
           </a:p>
@@ -1039,7 +1040,7 @@
           <a:p>
             <a:fld id="{FC8B51DD-4D59-4D3C-ADD1-B451BDC2F957}" type="datetimeFigureOut">
               <a:rPr lang="en-US" smtClean="0"/>
-              <a:t>9/27/2021</a:t>
+              <a:t>9/29/2021</a:t>
             </a:fld>
             <a:endParaRPr lang="en-US"/>
           </a:p>
@@ -1209,7 +1210,7 @@
           <a:p>
             <a:fld id="{FC8B51DD-4D59-4D3C-ADD1-B451BDC2F957}" type="datetimeFigureOut">
               <a:rPr lang="en-US" smtClean="0"/>
-              <a:t>9/27/2021</a:t>
+              <a:t>9/29/2021</a:t>
             </a:fld>
             <a:endParaRPr lang="en-US"/>
           </a:p>
@@ -1455,7 +1456,7 @@
           <a:p>
             <a:fld id="{FC8B51DD-4D59-4D3C-ADD1-B451BDC2F957}" type="datetimeFigureOut">
               <a:rPr lang="en-US" smtClean="0"/>
-              <a:t>9/27/2021</a:t>
+              <a:t>9/29/2021</a:t>
             </a:fld>
             <a:endParaRPr lang="en-US"/>
           </a:p>
@@ -1687,7 +1688,7 @@
           <a:p>
             <a:fld id="{FC8B51DD-4D59-4D3C-ADD1-B451BDC2F957}" type="datetimeFigureOut">
               <a:rPr lang="en-US" smtClean="0"/>
-              <a:t>9/27/2021</a:t>
+              <a:t>9/29/2021</a:t>
             </a:fld>
             <a:endParaRPr lang="en-US"/>
           </a:p>
@@ -2054,7 +2055,7 @@
           <a:p>
             <a:fld id="{FC8B51DD-4D59-4D3C-ADD1-B451BDC2F957}" type="datetimeFigureOut">
               <a:rPr lang="en-US" smtClean="0"/>
-              <a:t>9/27/2021</a:t>
+              <a:t>9/29/2021</a:t>
             </a:fld>
             <a:endParaRPr lang="en-US"/>
           </a:p>
@@ -2172,7 +2173,7 @@
           <a:p>
             <a:fld id="{FC8B51DD-4D59-4D3C-ADD1-B451BDC2F957}" type="datetimeFigureOut">
               <a:rPr lang="en-US" smtClean="0"/>
-              <a:t>9/27/2021</a:t>
+              <a:t>9/29/2021</a:t>
             </a:fld>
             <a:endParaRPr lang="en-US"/>
           </a:p>
@@ -2267,7 +2268,7 @@
           <a:p>
             <a:fld id="{FC8B51DD-4D59-4D3C-ADD1-B451BDC2F957}" type="datetimeFigureOut">
               <a:rPr lang="en-US" smtClean="0"/>
-              <a:t>9/27/2021</a:t>
+              <a:t>9/29/2021</a:t>
             </a:fld>
             <a:endParaRPr lang="en-US"/>
           </a:p>
@@ -2544,7 +2545,7 @@
           <a:p>
             <a:fld id="{FC8B51DD-4D59-4D3C-ADD1-B451BDC2F957}" type="datetimeFigureOut">
               <a:rPr lang="en-US" smtClean="0"/>
-              <a:t>9/27/2021</a:t>
+              <a:t>9/29/2021</a:t>
             </a:fld>
             <a:endParaRPr lang="en-US"/>
           </a:p>
@@ -2801,7 +2802,7 @@
           <a:p>
             <a:fld id="{FC8B51DD-4D59-4D3C-ADD1-B451BDC2F957}" type="datetimeFigureOut">
               <a:rPr lang="en-US" smtClean="0"/>
-              <a:t>9/27/2021</a:t>
+              <a:t>9/29/2021</a:t>
             </a:fld>
             <a:endParaRPr lang="en-US"/>
           </a:p>
@@ -3014,7 +3015,7 @@
           <a:p>
             <a:fld id="{FC8B51DD-4D59-4D3C-ADD1-B451BDC2F957}" type="datetimeFigureOut">
               <a:rPr lang="en-US" smtClean="0"/>
-              <a:t>9/27/2021</a:t>
+              <a:t>9/29/2021</a:t>
             </a:fld>
             <a:endParaRPr lang="en-US"/>
           </a:p>
@@ -3664,6 +3665,98 @@
 </file>
 
 <file path=ppt/slides/slide11.xml><?xml version="1.0" encoding="utf-8"?>
+<p:sld xmlns:a="http://schemas.openxmlformats.org/drawingml/2006/main" xmlns:r="http://schemas.openxmlformats.org/officeDocument/2006/relationships" xmlns:p="http://schemas.openxmlformats.org/presentationml/2006/main">
+  <p:cSld>
+    <p:spTree>
+      <p:nvGrpSpPr>
+        <p:cNvPr id="1" name=""/>
+        <p:cNvGrpSpPr/>
+        <p:nvPr/>
+      </p:nvGrpSpPr>
+      <p:grpSpPr>
+        <a:xfrm>
+          <a:off x="0" y="0"/>
+          <a:ext cx="0" cy="0"/>
+          <a:chOff x="0" y="0"/>
+          <a:chExt cx="0" cy="0"/>
+        </a:xfrm>
+      </p:grpSpPr>
+      <p:sp>
+        <p:nvSpPr>
+          <p:cNvPr id="2" name="Title 1">
+            <a:extLst>
+              <a:ext uri="{FF2B5EF4-FFF2-40B4-BE49-F238E27FC236}">
+                <a16:creationId xmlns:a16="http://schemas.microsoft.com/office/drawing/2014/main" id="{53F6953D-3237-4FA8-81B2-42E8AB4EBA5A}"/>
+              </a:ext>
+            </a:extLst>
+          </p:cNvPr>
+          <p:cNvSpPr>
+            <a:spLocks noGrp="1"/>
+          </p:cNvSpPr>
+          <p:nvPr>
+            <p:ph type="title"/>
+          </p:nvPr>
+        </p:nvSpPr>
+        <p:spPr>
+          <a:xfrm>
+            <a:off x="838200" y="365125"/>
+            <a:ext cx="4365396" cy="2632599"/>
+          </a:xfrm>
+        </p:spPr>
+        <p:txBody>
+          <a:bodyPr/>
+          <a:lstStyle/>
+          <a:p>
+            <a:r>
+              <a:rPr lang="en-US" dirty="0"/>
+              <a:t>Acting as a Server for Multiple Connections</a:t>
+            </a:r>
+          </a:p>
+        </p:txBody>
+      </p:sp>
+      <p:pic>
+        <p:nvPicPr>
+          <p:cNvPr id="5" name="Content Placeholder 4">
+            <a:extLst>
+              <a:ext uri="{FF2B5EF4-FFF2-40B4-BE49-F238E27FC236}">
+                <a16:creationId xmlns:a16="http://schemas.microsoft.com/office/drawing/2014/main" id="{FA6E70F8-A489-456C-9A26-BABE7B79850C}"/>
+              </a:ext>
+            </a:extLst>
+          </p:cNvPr>
+          <p:cNvPicPr>
+            <a:picLocks noGrp="1" noChangeAspect="1"/>
+          </p:cNvPicPr>
+          <p:nvPr>
+            <p:ph idx="1"/>
+          </p:nvPr>
+        </p:nvPicPr>
+        <p:blipFill>
+          <a:blip r:embed="rId2"/>
+          <a:stretch>
+            <a:fillRect/>
+          </a:stretch>
+        </p:blipFill>
+        <p:spPr>
+          <a:xfrm>
+            <a:off x="5571242" y="45425"/>
+            <a:ext cx="6296740" cy="6812575"/>
+          </a:xfrm>
+        </p:spPr>
+      </p:pic>
+    </p:spTree>
+    <p:extLst>
+      <p:ext uri="{BB962C8B-B14F-4D97-AF65-F5344CB8AC3E}">
+        <p14:creationId xmlns:p14="http://schemas.microsoft.com/office/powerpoint/2010/main" val="3555955879"/>
+      </p:ext>
+    </p:extLst>
+  </p:cSld>
+  <p:clrMapOvr>
+    <a:masterClrMapping/>
+  </p:clrMapOvr>
+</p:sld>
+</file>
+
+<file path=ppt/slides/slide12.xml><?xml version="1.0" encoding="utf-8"?>
 <p:sld xmlns:a="http://schemas.openxmlformats.org/drawingml/2006/main" xmlns:r="http://schemas.openxmlformats.org/officeDocument/2006/relationships" xmlns:p="http://schemas.openxmlformats.org/presentationml/2006/main">
   <p:cSld>
     <p:spTree>

</xml_diff>

<commit_message>
Updated slide on Multi Threaded servers
</commit_message>
<xml_diff>
--- a/threading.pptx
+++ b/threading.pptx
@@ -3743,6 +3743,223 @@
           </a:xfrm>
         </p:spPr>
       </p:pic>
+      <p:sp>
+        <p:nvSpPr>
+          <p:cNvPr id="4" name="Content Placeholder 2">
+            <a:extLst>
+              <a:ext uri="{FF2B5EF4-FFF2-40B4-BE49-F238E27FC236}">
+                <a16:creationId xmlns:a16="http://schemas.microsoft.com/office/drawing/2014/main" id="{D0D699BC-A1FA-43B2-89DD-7C53AA5C5AF1}"/>
+              </a:ext>
+            </a:extLst>
+          </p:cNvPr>
+          <p:cNvSpPr txBox="1">
+            <a:spLocks/>
+          </p:cNvSpPr>
+          <p:nvPr/>
+        </p:nvSpPr>
+        <p:spPr>
+          <a:xfrm>
+            <a:off x="838200" y="2997724"/>
+            <a:ext cx="4007177" cy="3064579"/>
+          </a:xfrm>
+          <a:prstGeom prst="rect">
+            <a:avLst/>
+          </a:prstGeom>
+        </p:spPr>
+        <p:txBody>
+          <a:bodyPr vert="horz" lIns="91440" tIns="45720" rIns="91440" bIns="45720" rtlCol="0">
+            <a:normAutofit/>
+          </a:bodyPr>
+          <a:lstStyle>
+            <a:lvl1pPr marL="228600" indent="-228600" algn="l" defTabSz="914400" rtl="0" eaLnBrk="1" latinLnBrk="0" hangingPunct="1">
+              <a:lnSpc>
+                <a:spcPct val="90000"/>
+              </a:lnSpc>
+              <a:spcBef>
+                <a:spcPts val="1000"/>
+              </a:spcBef>
+              <a:buFont typeface="Arial" panose="020B0604020202020204" pitchFamily="34" charset="0"/>
+              <a:buChar char="•"/>
+              <a:defRPr sz="2800" kern="1200">
+                <a:solidFill>
+                  <a:schemeClr val="tx1"/>
+                </a:solidFill>
+                <a:latin typeface="+mn-lt"/>
+                <a:ea typeface="+mn-ea"/>
+                <a:cs typeface="+mn-cs"/>
+              </a:defRPr>
+            </a:lvl1pPr>
+            <a:lvl2pPr marL="685800" indent="-228600" algn="l" defTabSz="914400" rtl="0" eaLnBrk="1" latinLnBrk="0" hangingPunct="1">
+              <a:lnSpc>
+                <a:spcPct val="90000"/>
+              </a:lnSpc>
+              <a:spcBef>
+                <a:spcPts val="500"/>
+              </a:spcBef>
+              <a:buFont typeface="Arial" panose="020B0604020202020204" pitchFamily="34" charset="0"/>
+              <a:buChar char="•"/>
+              <a:defRPr sz="2400" kern="1200">
+                <a:solidFill>
+                  <a:schemeClr val="tx1"/>
+                </a:solidFill>
+                <a:latin typeface="+mn-lt"/>
+                <a:ea typeface="+mn-ea"/>
+                <a:cs typeface="+mn-cs"/>
+              </a:defRPr>
+            </a:lvl2pPr>
+            <a:lvl3pPr marL="1143000" indent="-228600" algn="l" defTabSz="914400" rtl="0" eaLnBrk="1" latinLnBrk="0" hangingPunct="1">
+              <a:lnSpc>
+                <a:spcPct val="90000"/>
+              </a:lnSpc>
+              <a:spcBef>
+                <a:spcPts val="500"/>
+              </a:spcBef>
+              <a:buFont typeface="Arial" panose="020B0604020202020204" pitchFamily="34" charset="0"/>
+              <a:buChar char="•"/>
+              <a:defRPr sz="2000" kern="1200">
+                <a:solidFill>
+                  <a:schemeClr val="tx1"/>
+                </a:solidFill>
+                <a:latin typeface="+mn-lt"/>
+                <a:ea typeface="+mn-ea"/>
+                <a:cs typeface="+mn-cs"/>
+              </a:defRPr>
+            </a:lvl3pPr>
+            <a:lvl4pPr marL="1600200" indent="-228600" algn="l" defTabSz="914400" rtl="0" eaLnBrk="1" latinLnBrk="0" hangingPunct="1">
+              <a:lnSpc>
+                <a:spcPct val="90000"/>
+              </a:lnSpc>
+              <a:spcBef>
+                <a:spcPts val="500"/>
+              </a:spcBef>
+              <a:buFont typeface="Arial" panose="020B0604020202020204" pitchFamily="34" charset="0"/>
+              <a:buChar char="•"/>
+              <a:defRPr sz="1800" kern="1200">
+                <a:solidFill>
+                  <a:schemeClr val="tx1"/>
+                </a:solidFill>
+                <a:latin typeface="+mn-lt"/>
+                <a:ea typeface="+mn-ea"/>
+                <a:cs typeface="+mn-cs"/>
+              </a:defRPr>
+            </a:lvl4pPr>
+            <a:lvl5pPr marL="2057400" indent="-228600" algn="l" defTabSz="914400" rtl="0" eaLnBrk="1" latinLnBrk="0" hangingPunct="1">
+              <a:lnSpc>
+                <a:spcPct val="90000"/>
+              </a:lnSpc>
+              <a:spcBef>
+                <a:spcPts val="500"/>
+              </a:spcBef>
+              <a:buFont typeface="Arial" panose="020B0604020202020204" pitchFamily="34" charset="0"/>
+              <a:buChar char="•"/>
+              <a:defRPr sz="1800" kern="1200">
+                <a:solidFill>
+                  <a:schemeClr val="tx1"/>
+                </a:solidFill>
+                <a:latin typeface="+mn-lt"/>
+                <a:ea typeface="+mn-ea"/>
+                <a:cs typeface="+mn-cs"/>
+              </a:defRPr>
+            </a:lvl5pPr>
+            <a:lvl6pPr marL="2514600" indent="-228600" algn="l" defTabSz="914400" rtl="0" eaLnBrk="1" latinLnBrk="0" hangingPunct="1">
+              <a:lnSpc>
+                <a:spcPct val="90000"/>
+              </a:lnSpc>
+              <a:spcBef>
+                <a:spcPts val="500"/>
+              </a:spcBef>
+              <a:buFont typeface="Arial" panose="020B0604020202020204" pitchFamily="34" charset="0"/>
+              <a:buChar char="•"/>
+              <a:defRPr sz="1800" kern="1200">
+                <a:solidFill>
+                  <a:schemeClr val="tx1"/>
+                </a:solidFill>
+                <a:latin typeface="+mn-lt"/>
+                <a:ea typeface="+mn-ea"/>
+                <a:cs typeface="+mn-cs"/>
+              </a:defRPr>
+            </a:lvl6pPr>
+            <a:lvl7pPr marL="2971800" indent="-228600" algn="l" defTabSz="914400" rtl="0" eaLnBrk="1" latinLnBrk="0" hangingPunct="1">
+              <a:lnSpc>
+                <a:spcPct val="90000"/>
+              </a:lnSpc>
+              <a:spcBef>
+                <a:spcPts val="500"/>
+              </a:spcBef>
+              <a:buFont typeface="Arial" panose="020B0604020202020204" pitchFamily="34" charset="0"/>
+              <a:buChar char="•"/>
+              <a:defRPr sz="1800" kern="1200">
+                <a:solidFill>
+                  <a:schemeClr val="tx1"/>
+                </a:solidFill>
+                <a:latin typeface="+mn-lt"/>
+                <a:ea typeface="+mn-ea"/>
+                <a:cs typeface="+mn-cs"/>
+              </a:defRPr>
+            </a:lvl7pPr>
+            <a:lvl8pPr marL="3429000" indent="-228600" algn="l" defTabSz="914400" rtl="0" eaLnBrk="1" latinLnBrk="0" hangingPunct="1">
+              <a:lnSpc>
+                <a:spcPct val="90000"/>
+              </a:lnSpc>
+              <a:spcBef>
+                <a:spcPts val="500"/>
+              </a:spcBef>
+              <a:buFont typeface="Arial" panose="020B0604020202020204" pitchFamily="34" charset="0"/>
+              <a:buChar char="•"/>
+              <a:defRPr sz="1800" kern="1200">
+                <a:solidFill>
+                  <a:schemeClr val="tx1"/>
+                </a:solidFill>
+                <a:latin typeface="+mn-lt"/>
+                <a:ea typeface="+mn-ea"/>
+                <a:cs typeface="+mn-cs"/>
+              </a:defRPr>
+            </a:lvl8pPr>
+            <a:lvl9pPr marL="3886200" indent="-228600" algn="l" defTabSz="914400" rtl="0" eaLnBrk="1" latinLnBrk="0" hangingPunct="1">
+              <a:lnSpc>
+                <a:spcPct val="90000"/>
+              </a:lnSpc>
+              <a:spcBef>
+                <a:spcPts val="500"/>
+              </a:spcBef>
+              <a:buFont typeface="Arial" panose="020B0604020202020204" pitchFamily="34" charset="0"/>
+              <a:buChar char="•"/>
+              <a:defRPr sz="1800" kern="1200">
+                <a:solidFill>
+                  <a:schemeClr val="tx1"/>
+                </a:solidFill>
+                <a:latin typeface="+mn-lt"/>
+                <a:ea typeface="+mn-ea"/>
+                <a:cs typeface="+mn-cs"/>
+              </a:defRPr>
+            </a:lvl9pPr>
+          </a:lstStyle>
+          <a:p>
+            <a:pPr marL="0" indent="0">
+              <a:buNone/>
+            </a:pPr>
+            <a:r>
+              <a:rPr lang="en-US" dirty="0"/>
+              <a:t>Accept can be called multiple times for a listening socket</a:t>
+            </a:r>
+          </a:p>
+          <a:p>
+            <a:pPr marL="0" indent="0">
+              <a:buNone/>
+            </a:pPr>
+            <a:endParaRPr lang="en-US" dirty="0"/>
+          </a:p>
+          <a:p>
+            <a:pPr marL="0" indent="0">
+              <a:buNone/>
+            </a:pPr>
+            <a:r>
+              <a:rPr lang="en-US" dirty="0"/>
+              <a:t>Each time accept is called it waits for the next client to connect.</a:t>
+            </a:r>
+          </a:p>
+        </p:txBody>
+      </p:sp>
     </p:spTree>
     <p:extLst>
       <p:ext uri="{BB962C8B-B14F-4D97-AF65-F5344CB8AC3E}">

</xml_diff>